<commit_message>
Add dbt SQL models and project files
</commit_message>
<xml_diff>
--- a/IAG Take Home Exercise.pptx
+++ b/IAG Take Home Exercise.pptx
@@ -853,7 +853,7 @@
           <a:p>
             <a:fld id="{4D56F327-63C9-4D50-B79F-C07E3D196B1F}" type="datetimeFigureOut">
               <a:rPr lang="en-CA" smtClean="0"/>
-              <a:t>2025-07-26</a:t>
+              <a:t>2025-07-27</a:t>
             </a:fld>
             <a:endParaRPr lang="en-CA" dirty="0"/>
           </a:p>
@@ -1053,7 +1053,7 @@
           <a:p>
             <a:fld id="{4D56F327-63C9-4D50-B79F-C07E3D196B1F}" type="datetimeFigureOut">
               <a:rPr lang="en-CA" smtClean="0"/>
-              <a:t>2025-07-26</a:t>
+              <a:t>2025-07-27</a:t>
             </a:fld>
             <a:endParaRPr lang="en-CA" dirty="0"/>
           </a:p>
@@ -1263,7 +1263,7 @@
           <a:p>
             <a:fld id="{4D56F327-63C9-4D50-B79F-C07E3D196B1F}" type="datetimeFigureOut">
               <a:rPr lang="en-CA" smtClean="0"/>
-              <a:t>2025-07-26</a:t>
+              <a:t>2025-07-27</a:t>
             </a:fld>
             <a:endParaRPr lang="en-CA" dirty="0"/>
           </a:p>
@@ -1463,7 +1463,7 @@
           <a:p>
             <a:fld id="{4D56F327-63C9-4D50-B79F-C07E3D196B1F}" type="datetimeFigureOut">
               <a:rPr lang="en-CA" smtClean="0"/>
-              <a:t>2025-07-26</a:t>
+              <a:t>2025-07-27</a:t>
             </a:fld>
             <a:endParaRPr lang="en-CA" dirty="0"/>
           </a:p>
@@ -1739,7 +1739,7 @@
           <a:p>
             <a:fld id="{4D56F327-63C9-4D50-B79F-C07E3D196B1F}" type="datetimeFigureOut">
               <a:rPr lang="en-CA" smtClean="0"/>
-              <a:t>2025-07-26</a:t>
+              <a:t>2025-07-27</a:t>
             </a:fld>
             <a:endParaRPr lang="en-CA" dirty="0"/>
           </a:p>
@@ -2007,7 +2007,7 @@
           <a:p>
             <a:fld id="{4D56F327-63C9-4D50-B79F-C07E3D196B1F}" type="datetimeFigureOut">
               <a:rPr lang="en-CA" smtClean="0"/>
-              <a:t>2025-07-26</a:t>
+              <a:t>2025-07-27</a:t>
             </a:fld>
             <a:endParaRPr lang="en-CA" dirty="0"/>
           </a:p>
@@ -2422,7 +2422,7 @@
           <a:p>
             <a:fld id="{4D56F327-63C9-4D50-B79F-C07E3D196B1F}" type="datetimeFigureOut">
               <a:rPr lang="en-CA" smtClean="0"/>
-              <a:t>2025-07-26</a:t>
+              <a:t>2025-07-27</a:t>
             </a:fld>
             <a:endParaRPr lang="en-CA" dirty="0"/>
           </a:p>
@@ -2564,7 +2564,7 @@
           <a:p>
             <a:fld id="{4D56F327-63C9-4D50-B79F-C07E3D196B1F}" type="datetimeFigureOut">
               <a:rPr lang="en-CA" smtClean="0"/>
-              <a:t>2025-07-26</a:t>
+              <a:t>2025-07-27</a:t>
             </a:fld>
             <a:endParaRPr lang="en-CA" dirty="0"/>
           </a:p>
@@ -2677,7 +2677,7 @@
           <a:p>
             <a:fld id="{4D56F327-63C9-4D50-B79F-C07E3D196B1F}" type="datetimeFigureOut">
               <a:rPr lang="en-CA" smtClean="0"/>
-              <a:t>2025-07-26</a:t>
+              <a:t>2025-07-27</a:t>
             </a:fld>
             <a:endParaRPr lang="en-CA" dirty="0"/>
           </a:p>
@@ -2990,7 +2990,7 @@
           <a:p>
             <a:fld id="{4D56F327-63C9-4D50-B79F-C07E3D196B1F}" type="datetimeFigureOut">
               <a:rPr lang="en-CA" smtClean="0"/>
-              <a:t>2025-07-26</a:t>
+              <a:t>2025-07-27</a:t>
             </a:fld>
             <a:endParaRPr lang="en-CA" dirty="0"/>
           </a:p>
@@ -3279,7 +3279,7 @@
           <a:p>
             <a:fld id="{4D56F327-63C9-4D50-B79F-C07E3D196B1F}" type="datetimeFigureOut">
               <a:rPr lang="en-CA" smtClean="0"/>
-              <a:t>2025-07-26</a:t>
+              <a:t>2025-07-27</a:t>
             </a:fld>
             <a:endParaRPr lang="en-CA" dirty="0"/>
           </a:p>
@@ -3522,7 +3522,7 @@
           <a:p>
             <a:fld id="{4D56F327-63C9-4D50-B79F-C07E3D196B1F}" type="datetimeFigureOut">
               <a:rPr lang="en-CA" smtClean="0"/>
-              <a:t>2025-07-26</a:t>
+              <a:t>2025-07-27</a:t>
             </a:fld>
             <a:endParaRPr lang="en-CA" dirty="0"/>
           </a:p>
@@ -6458,15 +6458,7 @@
           <a:p>
             <a:r>
               <a:rPr lang="en-US" sz="1400" dirty="0"/>
-              <a:t>* Note: Models (SQL), Documentation (.</a:t>
-            </a:r>
-            <a:r>
-              <a:rPr lang="en-US" sz="1400" dirty="0" err="1"/>
-              <a:t>yml</a:t>
-            </a:r>
-            <a:r>
-              <a:rPr lang="en-US" sz="1400" dirty="0"/>
-              <a:t>) and sample Airflow DAG (Python) located here:</a:t>
+              <a:t>* Note: Models (SQL), Documentation (.yml) and sample Airflow DAG (Python) located here:</a:t>
             </a:r>
           </a:p>
           <a:p>
@@ -7530,27 +7522,8 @@
                   </a:schemeClr>
                 </a:solidFill>
               </a:rPr>
-              <a:t>Summary </a:t>
-            </a:r>
-            <a:r>
-              <a:rPr lang="en-US" sz="1200" dirty="0" err="1">
-                <a:solidFill>
-                  <a:schemeClr val="tx1">
-                    <a:lumMod val="75000"/>
-                    <a:lumOff val="25000"/>
-                  </a:schemeClr>
-                </a:solidFill>
-              </a:rPr>
-              <a:t>profile_lifcycle_model</a:t>
-            </a:r>
-            <a:endParaRPr lang="en-US" sz="1200" dirty="0">
-              <a:solidFill>
-                <a:schemeClr val="tx1">
-                  <a:lumMod val="75000"/>
-                  <a:lumOff val="25000"/>
-                </a:schemeClr>
-              </a:solidFill>
-            </a:endParaRPr>
+              <a:t>Summary profile_lifcycle_model</a:t>
+            </a:r>
           </a:p>
           <a:p>
             <a:pPr marL="171450" indent="-171450">
@@ -8149,15 +8122,7 @@
                     <a:p>
                       <a:r>
                         <a:rPr lang="en-US" sz="1400" dirty="0"/>
-                        <a:t>These are currently set to create a materialized view. Would need to explore how often policy details change, incremental or </a:t>
-                      </a:r>
-                      <a:r>
-                        <a:rPr lang="en-US" sz="1400" dirty="0" err="1"/>
-                        <a:t>upsert</a:t>
-                      </a:r>
-                      <a:r>
-                        <a:rPr lang="en-US" sz="1400" dirty="0"/>
-                        <a:t> may be more efficient</a:t>
+                        <a:t>These are currently set to create a materialized view. Would need to explore how often policy details change, incremental or upsert may be more efficient</a:t>
                       </a:r>
                       <a:endParaRPr lang="en-CA" sz="1400" dirty="0"/>
                     </a:p>
@@ -8206,15 +8171,7 @@
                       </a:pPr>
                       <a:r>
                         <a:rPr lang="en-US" sz="1400" dirty="0"/>
-                        <a:t>Access details sorted in </a:t>
-                      </a:r>
-                      <a:r>
-                        <a:rPr lang="en-US" sz="1400" dirty="0" err="1"/>
-                        <a:t>profile.yml</a:t>
-                      </a:r>
-                      <a:r>
-                        <a:rPr lang="en-US" sz="1400" dirty="0"/>
-                        <a:t> or similar. Not hard-coded</a:t>
+                        <a:t>Access details sorted in profile.yml or similar. Not hard-coded</a:t>
                       </a:r>
                       <a:endParaRPr lang="en-CA" sz="1400" dirty="0"/>
                     </a:p>
@@ -8253,15 +8210,7 @@
                       </a:pPr>
                       <a:r>
                         <a:rPr lang="en-US" sz="1400" dirty="0"/>
-                        <a:t>Some checks are built into </a:t>
-                      </a:r>
-                      <a:r>
-                        <a:rPr lang="en-US" sz="1400" dirty="0" err="1"/>
-                        <a:t>schema.yml</a:t>
-                      </a:r>
-                      <a:r>
-                        <a:rPr lang="en-US" sz="1400" dirty="0"/>
-                        <a:t> to ensure data accuracy, e.g. policy number must be a unique value</a:t>
+                        <a:t>Some checks are built into schema.yml to ensure data accuracy, e.g. policy number must be a unique value</a:t>
                       </a:r>
                     </a:p>
                     <a:p>
@@ -8494,7 +8443,7 @@
           <a:lstStyle/>
           <a:p>
             <a:pPr algn="ctr"/>
-            <a:endParaRPr lang="en-CA">
+            <a:endParaRPr lang="en-CA" dirty="0">
               <a:solidFill>
                 <a:srgbClr val="4B0076"/>
               </a:solidFill>
@@ -8547,7 +8496,7 @@
           <a:lstStyle/>
           <a:p>
             <a:pPr algn="ctr"/>
-            <a:endParaRPr lang="en-CA"/>
+            <a:endParaRPr lang="en-CA" dirty="0"/>
           </a:p>
         </p:txBody>
       </p:sp>
@@ -8596,7 +8545,7 @@
           <a:lstStyle/>
           <a:p>
             <a:pPr algn="ctr"/>
-            <a:endParaRPr lang="en-CA">
+            <a:endParaRPr lang="en-CA" dirty="0">
               <a:solidFill>
                 <a:srgbClr val="4B0076"/>
               </a:solidFill>
@@ -8664,15 +8613,7 @@
           <a:p>
             <a:r>
               <a:rPr lang="en-US" sz="2800" dirty="0"/>
-              <a:t>Three models built in DBT: </a:t>
-            </a:r>
-            <a:r>
-              <a:rPr lang="en-US" sz="2800" dirty="0" err="1"/>
-              <a:t>src_policy_events</a:t>
-            </a:r>
-            <a:r>
-              <a:rPr lang="en-US" sz="2800" dirty="0"/>
-              <a:t>, quote_bind and policy_lifecycle_model, documentation in schema.yml*</a:t>
+              <a:t>Three models built in DBT: src_policy_events, quote_bind and policy_lifecycle_model, documentation in schema.yml*</a:t>
             </a:r>
             <a:endParaRPr lang="en-CA" sz="2800" dirty="0"/>
           </a:p>
@@ -8771,18 +8712,13 @@
               <a:buAutoNum type="arabicPeriod"/>
             </a:pPr>
             <a:r>
-              <a:rPr lang="en-US" sz="1400" b="1" dirty="0" err="1">
+              <a:rPr lang="en-US" sz="1400" b="1" dirty="0">
                 <a:solidFill>
                   <a:srgbClr val="4B0076"/>
                 </a:solidFill>
               </a:rPr>
               <a:t>SRC_Policy_Events</a:t>
             </a:r>
-            <a:endParaRPr lang="en-US" sz="1400" b="1" dirty="0">
-              <a:solidFill>
-                <a:srgbClr val="4B0076"/>
-              </a:solidFill>
-            </a:endParaRPr>
           </a:p>
           <a:p>
             <a:pPr marL="800100" lvl="1" indent="-342900">
@@ -9554,7 +9490,7 @@
           <a:lstStyle/>
           <a:p>
             <a:pPr algn="ctr"/>
-            <a:endParaRPr lang="en-CA"/>
+            <a:endParaRPr lang="en-CA" dirty="0"/>
           </a:p>
         </p:txBody>
       </p:sp>
@@ -10150,18 +10086,13 @@
           <a:p>
             <a:pPr algn="ctr"/>
             <a:r>
-              <a:rPr lang="en-US" sz="1400" dirty="0" err="1">
+              <a:rPr lang="en-US" sz="1400" dirty="0">
                 <a:solidFill>
                   <a:schemeClr val="tx1"/>
                 </a:solidFill>
               </a:rPr>
               <a:t>Get_failed_tasks</a:t>
             </a:r>
-            <a:endParaRPr lang="en-US" sz="1400" dirty="0">
-              <a:solidFill>
-                <a:schemeClr val="tx1"/>
-              </a:solidFill>
-            </a:endParaRPr>
           </a:p>
           <a:p>
             <a:pPr algn="ctr"/>
@@ -10659,15 +10590,7 @@
                   <a:schemeClr val="tx1"/>
                 </a:solidFill>
               </a:rPr>
-              <a:t>Run </a:t>
-            </a:r>
-            <a:r>
-              <a:rPr lang="en-US" sz="1400" dirty="0" err="1">
-                <a:solidFill>
-                  <a:schemeClr val="tx1"/>
-                </a:solidFill>
-              </a:rPr>
-              <a:t>src_policy_events</a:t>
+              <a:t>Run src_policy_events</a:t>
             </a:r>
             <a:endParaRPr lang="en-CA" sz="1400" dirty="0">
               <a:solidFill>
@@ -11000,6 +10923,82 @@
           </a:fontRef>
         </p:style>
       </p:cxnSp>
+      <p:sp>
+        <p:nvSpPr>
+          <p:cNvPr id="2" name="TextBox 1">
+            <a:extLst>
+              <a:ext uri="{FF2B5EF4-FFF2-40B4-BE49-F238E27FC236}">
+                <a16:creationId xmlns:a16="http://schemas.microsoft.com/office/drawing/2014/main" id="{567B9376-4F0E-F95D-A9F5-0B284B0277C8}"/>
+              </a:ext>
+            </a:extLst>
+          </p:cNvPr>
+          <p:cNvSpPr txBox="1"/>
+          <p:nvPr/>
+        </p:nvSpPr>
+        <p:spPr>
+          <a:xfrm>
+            <a:off x="8822989" y="4211506"/>
+            <a:ext cx="508787" cy="307777"/>
+          </a:xfrm>
+          <a:prstGeom prst="rect">
+            <a:avLst/>
+          </a:prstGeom>
+          <a:solidFill>
+            <a:schemeClr val="bg1"/>
+          </a:solidFill>
+        </p:spPr>
+        <p:txBody>
+          <a:bodyPr wrap="square" rtlCol="0">
+            <a:spAutoFit/>
+          </a:bodyPr>
+          <a:lstStyle/>
+          <a:p>
+            <a:r>
+              <a:rPr lang="en-US" sz="1400" dirty="0"/>
+              <a:t>Yes</a:t>
+            </a:r>
+            <a:endParaRPr lang="en-CA" sz="1400" dirty="0"/>
+          </a:p>
+        </p:txBody>
+      </p:sp>
+      <p:sp>
+        <p:nvSpPr>
+          <p:cNvPr id="3" name="TextBox 2">
+            <a:extLst>
+              <a:ext uri="{FF2B5EF4-FFF2-40B4-BE49-F238E27FC236}">
+                <a16:creationId xmlns:a16="http://schemas.microsoft.com/office/drawing/2014/main" id="{01062AA4-5F83-3BAA-A1FE-DA6BBEF7143A}"/>
+              </a:ext>
+            </a:extLst>
+          </p:cNvPr>
+          <p:cNvSpPr txBox="1"/>
+          <p:nvPr/>
+        </p:nvSpPr>
+        <p:spPr>
+          <a:xfrm>
+            <a:off x="9916991" y="3390089"/>
+            <a:ext cx="431361" cy="307777"/>
+          </a:xfrm>
+          <a:prstGeom prst="rect">
+            <a:avLst/>
+          </a:prstGeom>
+          <a:solidFill>
+            <a:schemeClr val="bg1"/>
+          </a:solidFill>
+        </p:spPr>
+        <p:txBody>
+          <a:bodyPr wrap="square" rtlCol="0">
+            <a:spAutoFit/>
+          </a:bodyPr>
+          <a:lstStyle/>
+          <a:p>
+            <a:r>
+              <a:rPr lang="en-US" sz="1400" dirty="0"/>
+              <a:t>No</a:t>
+            </a:r>
+            <a:endParaRPr lang="en-CA" sz="1400" dirty="0"/>
+          </a:p>
+        </p:txBody>
+      </p:sp>
     </p:spTree>
     <p:extLst>
       <p:ext uri="{BB962C8B-B14F-4D97-AF65-F5344CB8AC3E}">

</xml_diff>